<commit_message>
Add Sharp threshold figure
</commit_message>
<xml_diff>
--- a/drawings/rectanglesproof.pptx
+++ b/drawings/rectanglesproof.pptx
@@ -7,9 +7,10 @@
   <p:sldIdLst>
     <p:sldId id="256" r:id="rId2"/>
     <p:sldId id="258" r:id="rId3"/>
-    <p:sldId id="259" r:id="rId4"/>
-    <p:sldId id="260" r:id="rId5"/>
-    <p:sldId id="257" r:id="rId6"/>
+    <p:sldId id="261" r:id="rId4"/>
+    <p:sldId id="259" r:id="rId5"/>
+    <p:sldId id="260" r:id="rId6"/>
+    <p:sldId id="257" r:id="rId7"/>
   </p:sldIdLst>
   <p:sldSz cx="12192000" cy="6858000"/>
   <p:notesSz cx="6858000" cy="9144000"/>
@@ -119,7 +120,7 @@
 <file path=ppt/revisionInfo.xml><?xml version="1.0" encoding="utf-8"?>
 <p1510:revInfo xmlns:a="http://schemas.openxmlformats.org/drawingml/2006/main" xmlns:r="http://schemas.openxmlformats.org/officeDocument/2006/relationships" xmlns:p1510="http://schemas.microsoft.com/office/powerpoint/2015/10/main">
   <p1510:revLst>
-    <p1510:client id="{7DFC69C6-FC9F-4905-B747-72124A4C8716}" v="32" dt="2022-04-27T19:10:22.489"/>
+    <p1510:client id="{7DFC69C6-FC9F-4905-B747-72124A4C8716}" v="83" dt="2022-04-28T09:44:36.213"/>
   </p1510:revLst>
 </p1510:revInfo>
 </file>
@@ -153,7 +154,7 @@
   <pc:docChgLst>
     <pc:chgData name="Jonathan Marriott" userId="cb279729-bf8e-4205-bddf-7ed8b220c757" providerId="ADAL" clId="{7DFC69C6-FC9F-4905-B747-72124A4C8716}"/>
     <pc:docChg chg="undo custSel addSld modSld">
-      <pc:chgData name="Jonathan Marriott" userId="cb279729-bf8e-4205-bddf-7ed8b220c757" providerId="ADAL" clId="{7DFC69C6-FC9F-4905-B747-72124A4C8716}" dt="2022-04-27T19:10:22.487" v="141" actId="1076"/>
+      <pc:chgData name="Jonathan Marriott" userId="cb279729-bf8e-4205-bddf-7ed8b220c757" providerId="ADAL" clId="{7DFC69C6-FC9F-4905-B747-72124A4C8716}" dt="2022-04-28T09:49:01.259" v="540" actId="1582"/>
       <pc:docMkLst>
         <pc:docMk/>
       </pc:docMkLst>
@@ -2447,6 +2448,237 @@
             <ac:picMk id="3073" creationId="{6BDC4E5B-D0AC-415A-ABB8-9D2ECF31F18E}"/>
           </ac:picMkLst>
         </pc:picChg>
+      </pc:sldChg>
+      <pc:sldChg chg="addSp delSp modSp new mod">
+        <pc:chgData name="Jonathan Marriott" userId="cb279729-bf8e-4205-bddf-7ed8b220c757" providerId="ADAL" clId="{7DFC69C6-FC9F-4905-B747-72124A4C8716}" dt="2022-04-28T09:49:01.259" v="540" actId="1582"/>
+        <pc:sldMkLst>
+          <pc:docMk/>
+          <pc:sldMk cId="2445644065" sldId="261"/>
+        </pc:sldMkLst>
+        <pc:spChg chg="del">
+          <ac:chgData name="Jonathan Marriott" userId="cb279729-bf8e-4205-bddf-7ed8b220c757" providerId="ADAL" clId="{7DFC69C6-FC9F-4905-B747-72124A4C8716}" dt="2022-04-28T09:21:37.561" v="143" actId="478"/>
+          <ac:spMkLst>
+            <pc:docMk/>
+            <pc:sldMk cId="2445644065" sldId="261"/>
+            <ac:spMk id="2" creationId="{019C27BA-E370-447A-8176-335D72275217}"/>
+          </ac:spMkLst>
+        </pc:spChg>
+        <pc:spChg chg="del">
+          <ac:chgData name="Jonathan Marriott" userId="cb279729-bf8e-4205-bddf-7ed8b220c757" providerId="ADAL" clId="{7DFC69C6-FC9F-4905-B747-72124A4C8716}" dt="2022-04-28T09:21:59.119" v="144" actId="478"/>
+          <ac:spMkLst>
+            <pc:docMk/>
+            <pc:sldMk cId="2445644065" sldId="261"/>
+            <ac:spMk id="3" creationId="{6DA632DE-BF00-47A6-BF45-209F41C5CB9D}"/>
+          </ac:spMkLst>
+        </pc:spChg>
+        <pc:spChg chg="add mod">
+          <ac:chgData name="Jonathan Marriott" userId="cb279729-bf8e-4205-bddf-7ed8b220c757" providerId="ADAL" clId="{7DFC69C6-FC9F-4905-B747-72124A4C8716}" dt="2022-04-28T09:44:36.213" v="538" actId="164"/>
+          <ac:spMkLst>
+            <pc:docMk/>
+            <pc:sldMk cId="2445644065" sldId="261"/>
+            <ac:spMk id="9" creationId="{BCAD10AF-702D-4D18-843B-4D924F73A9CB}"/>
+          </ac:spMkLst>
+        </pc:spChg>
+        <pc:spChg chg="add mod">
+          <ac:chgData name="Jonathan Marriott" userId="cb279729-bf8e-4205-bddf-7ed8b220c757" providerId="ADAL" clId="{7DFC69C6-FC9F-4905-B747-72124A4C8716}" dt="2022-04-28T09:44:36.213" v="538" actId="164"/>
+          <ac:spMkLst>
+            <pc:docMk/>
+            <pc:sldMk cId="2445644065" sldId="261"/>
+            <ac:spMk id="10" creationId="{3BC021FD-6B61-4C53-888F-62BE74133FDF}"/>
+          </ac:spMkLst>
+        </pc:spChg>
+        <pc:spChg chg="add mod">
+          <ac:chgData name="Jonathan Marriott" userId="cb279729-bf8e-4205-bddf-7ed8b220c757" providerId="ADAL" clId="{7DFC69C6-FC9F-4905-B747-72124A4C8716}" dt="2022-04-28T09:44:36.213" v="538" actId="164"/>
+          <ac:spMkLst>
+            <pc:docMk/>
+            <pc:sldMk cId="2445644065" sldId="261"/>
+            <ac:spMk id="11" creationId="{5F0A1128-8BB1-4FA4-B685-D6B0165B3BE3}"/>
+          </ac:spMkLst>
+        </pc:spChg>
+        <pc:spChg chg="add mod">
+          <ac:chgData name="Jonathan Marriott" userId="cb279729-bf8e-4205-bddf-7ed8b220c757" providerId="ADAL" clId="{7DFC69C6-FC9F-4905-B747-72124A4C8716}" dt="2022-04-28T09:44:36.213" v="538" actId="164"/>
+          <ac:spMkLst>
+            <pc:docMk/>
+            <pc:sldMk cId="2445644065" sldId="261"/>
+            <ac:spMk id="12" creationId="{25002CEF-D5F4-4E1D-8E60-7E46B62A0D0A}"/>
+          </ac:spMkLst>
+        </pc:spChg>
+        <pc:spChg chg="add mod">
+          <ac:chgData name="Jonathan Marriott" userId="cb279729-bf8e-4205-bddf-7ed8b220c757" providerId="ADAL" clId="{7DFC69C6-FC9F-4905-B747-72124A4C8716}" dt="2022-04-28T09:44:36.213" v="538" actId="164"/>
+          <ac:spMkLst>
+            <pc:docMk/>
+            <pc:sldMk cId="2445644065" sldId="261"/>
+            <ac:spMk id="16" creationId="{4668AD2A-1AB7-44CD-B647-AD4E79FB9EEF}"/>
+          </ac:spMkLst>
+        </pc:spChg>
+        <pc:spChg chg="add mod">
+          <ac:chgData name="Jonathan Marriott" userId="cb279729-bf8e-4205-bddf-7ed8b220c757" providerId="ADAL" clId="{7DFC69C6-FC9F-4905-B747-72124A4C8716}" dt="2022-04-28T09:44:36.213" v="538" actId="164"/>
+          <ac:spMkLst>
+            <pc:docMk/>
+            <pc:sldMk cId="2445644065" sldId="261"/>
+            <ac:spMk id="17" creationId="{8408BBD5-0FF0-4390-BE21-5C755CF26529}"/>
+          </ac:spMkLst>
+        </pc:spChg>
+        <pc:spChg chg="add del">
+          <ac:chgData name="Jonathan Marriott" userId="cb279729-bf8e-4205-bddf-7ed8b220c757" providerId="ADAL" clId="{7DFC69C6-FC9F-4905-B747-72124A4C8716}" dt="2022-04-28T09:40:35.415" v="488" actId="478"/>
+          <ac:spMkLst>
+            <pc:docMk/>
+            <pc:sldMk cId="2445644065" sldId="261"/>
+            <ac:spMk id="29" creationId="{4FC65F26-5E84-455F-A45D-038D79733163}"/>
+          </ac:spMkLst>
+        </pc:spChg>
+        <pc:spChg chg="add del">
+          <ac:chgData name="Jonathan Marriott" userId="cb279729-bf8e-4205-bddf-7ed8b220c757" providerId="ADAL" clId="{7DFC69C6-FC9F-4905-B747-72124A4C8716}" dt="2022-04-28T09:41:11.001" v="490" actId="11529"/>
+          <ac:spMkLst>
+            <pc:docMk/>
+            <pc:sldMk cId="2445644065" sldId="261"/>
+            <ac:spMk id="30" creationId="{E41EB4CA-4A14-4116-A713-D68E684A014A}"/>
+          </ac:spMkLst>
+        </pc:spChg>
+        <pc:spChg chg="add mod">
+          <ac:chgData name="Jonathan Marriott" userId="cb279729-bf8e-4205-bddf-7ed8b220c757" providerId="ADAL" clId="{7DFC69C6-FC9F-4905-B747-72124A4C8716}" dt="2022-04-28T09:49:01.259" v="540" actId="1582"/>
+          <ac:spMkLst>
+            <pc:docMk/>
+            <pc:sldMk cId="2445644065" sldId="261"/>
+            <ac:spMk id="33" creationId="{EA139643-B1FA-4F30-93C9-537ECD23AEA9}"/>
+          </ac:spMkLst>
+        </pc:spChg>
+        <pc:grpChg chg="mod">
+          <ac:chgData name="Jonathan Marriott" userId="cb279729-bf8e-4205-bddf-7ed8b220c757" providerId="ADAL" clId="{7DFC69C6-FC9F-4905-B747-72124A4C8716}" dt="2022-04-28T09:40:13.523" v="483"/>
+          <ac:grpSpMkLst>
+            <pc:docMk/>
+            <pc:sldMk cId="2445644065" sldId="261"/>
+            <ac:grpSpMk id="28" creationId="{43907534-85B7-41E8-9C3E-4A39E4E6B85E}"/>
+          </ac:grpSpMkLst>
+        </pc:grpChg>
+        <pc:grpChg chg="add mod">
+          <ac:chgData name="Jonathan Marriott" userId="cb279729-bf8e-4205-bddf-7ed8b220c757" providerId="ADAL" clId="{7DFC69C6-FC9F-4905-B747-72124A4C8716}" dt="2022-04-28T09:44:36.213" v="538" actId="164"/>
+          <ac:grpSpMkLst>
+            <pc:docMk/>
+            <pc:sldMk cId="2445644065" sldId="261"/>
+            <ac:grpSpMk id="34" creationId="{2E082531-2A68-4DD4-8E48-1D30431DD1A4}"/>
+          </ac:grpSpMkLst>
+        </pc:grpChg>
+        <pc:inkChg chg="add del">
+          <ac:chgData name="Jonathan Marriott" userId="cb279729-bf8e-4205-bddf-7ed8b220c757" providerId="ADAL" clId="{7DFC69C6-FC9F-4905-B747-72124A4C8716}" dt="2022-04-28T09:39:18.424" v="470" actId="21"/>
+          <ac:inkMkLst>
+            <pc:docMk/>
+            <pc:sldMk cId="2445644065" sldId="261"/>
+            <ac:inkMk id="20" creationId="{442D0C18-EB0D-4AC3-9AF2-789F40CFB342}"/>
+          </ac:inkMkLst>
+        </pc:inkChg>
+        <pc:inkChg chg="add del">
+          <ac:chgData name="Jonathan Marriott" userId="cb279729-bf8e-4205-bddf-7ed8b220c757" providerId="ADAL" clId="{7DFC69C6-FC9F-4905-B747-72124A4C8716}" dt="2022-04-28T09:39:40" v="472"/>
+          <ac:inkMkLst>
+            <pc:docMk/>
+            <pc:sldMk cId="2445644065" sldId="261"/>
+            <ac:inkMk id="21" creationId="{38480A8D-2B07-4AFE-962F-26B588D831D3}"/>
+          </ac:inkMkLst>
+        </pc:inkChg>
+        <pc:inkChg chg="add del">
+          <ac:chgData name="Jonathan Marriott" userId="cb279729-bf8e-4205-bddf-7ed8b220c757" providerId="ADAL" clId="{7DFC69C6-FC9F-4905-B747-72124A4C8716}" dt="2022-04-28T09:39:45.999" v="474" actId="9405"/>
+          <ac:inkMkLst>
+            <pc:docMk/>
+            <pc:sldMk cId="2445644065" sldId="261"/>
+            <ac:inkMk id="22" creationId="{2F1F6522-9B6B-4C7D-B755-B8E4618F0FCF}"/>
+          </ac:inkMkLst>
+        </pc:inkChg>
+        <pc:inkChg chg="add del">
+          <ac:chgData name="Jonathan Marriott" userId="cb279729-bf8e-4205-bddf-7ed8b220c757" providerId="ADAL" clId="{7DFC69C6-FC9F-4905-B747-72124A4C8716}" dt="2022-04-28T09:39:51.750" v="476" actId="9405"/>
+          <ac:inkMkLst>
+            <pc:docMk/>
+            <pc:sldMk cId="2445644065" sldId="261"/>
+            <ac:inkMk id="23" creationId="{94267D93-BA79-4CC6-8297-E61D98CA70DC}"/>
+          </ac:inkMkLst>
+        </pc:inkChg>
+        <pc:inkChg chg="add del">
+          <ac:chgData name="Jonathan Marriott" userId="cb279729-bf8e-4205-bddf-7ed8b220c757" providerId="ADAL" clId="{7DFC69C6-FC9F-4905-B747-72124A4C8716}" dt="2022-04-28T09:40:19.560" v="486" actId="478"/>
+          <ac:inkMkLst>
+            <pc:docMk/>
+            <pc:sldMk cId="2445644065" sldId="261"/>
+            <ac:inkMk id="24" creationId="{0C3A92F1-FBD8-46D0-A2D5-D074887B88B0}"/>
+          </ac:inkMkLst>
+        </pc:inkChg>
+        <pc:inkChg chg="add del mod">
+          <ac:chgData name="Jonathan Marriott" userId="cb279729-bf8e-4205-bddf-7ed8b220c757" providerId="ADAL" clId="{7DFC69C6-FC9F-4905-B747-72124A4C8716}" dt="2022-04-28T09:40:14.320" v="485" actId="9405"/>
+          <ac:inkMkLst>
+            <pc:docMk/>
+            <pc:sldMk cId="2445644065" sldId="261"/>
+            <ac:inkMk id="25" creationId="{7BE57B94-13D0-435C-8604-D07CC6B86076}"/>
+          </ac:inkMkLst>
+        </pc:inkChg>
+        <pc:inkChg chg="add del mod">
+          <ac:chgData name="Jonathan Marriott" userId="cb279729-bf8e-4205-bddf-7ed8b220c757" providerId="ADAL" clId="{7DFC69C6-FC9F-4905-B747-72124A4C8716}" dt="2022-04-28T09:40:13.830" v="484" actId="9405"/>
+          <ac:inkMkLst>
+            <pc:docMk/>
+            <pc:sldMk cId="2445644065" sldId="261"/>
+            <ac:inkMk id="26" creationId="{1D3E1585-CC79-42FB-A725-03EC6F99A6DB}"/>
+          </ac:inkMkLst>
+        </pc:inkChg>
+        <pc:inkChg chg="add del mod">
+          <ac:chgData name="Jonathan Marriott" userId="cb279729-bf8e-4205-bddf-7ed8b220c757" providerId="ADAL" clId="{7DFC69C6-FC9F-4905-B747-72124A4C8716}" dt="2022-04-28T09:40:13.523" v="483"/>
+          <ac:inkMkLst>
+            <pc:docMk/>
+            <pc:sldMk cId="2445644065" sldId="261"/>
+            <ac:inkMk id="27" creationId="{ADDE9069-52EA-480F-B0B1-A9054677B3E5}"/>
+          </ac:inkMkLst>
+        </pc:inkChg>
+        <pc:cxnChg chg="add mod">
+          <ac:chgData name="Jonathan Marriott" userId="cb279729-bf8e-4205-bddf-7ed8b220c757" providerId="ADAL" clId="{7DFC69C6-FC9F-4905-B747-72124A4C8716}" dt="2022-04-28T09:44:36.213" v="538" actId="164"/>
+          <ac:cxnSpMkLst>
+            <pc:docMk/>
+            <pc:sldMk cId="2445644065" sldId="261"/>
+            <ac:cxnSpMk id="5" creationId="{1DE88770-6193-42C5-9612-29489086FC81}"/>
+          </ac:cxnSpMkLst>
+        </pc:cxnChg>
+        <pc:cxnChg chg="add mod">
+          <ac:chgData name="Jonathan Marriott" userId="cb279729-bf8e-4205-bddf-7ed8b220c757" providerId="ADAL" clId="{7DFC69C6-FC9F-4905-B747-72124A4C8716}" dt="2022-04-28T09:44:36.213" v="538" actId="164"/>
+          <ac:cxnSpMkLst>
+            <pc:docMk/>
+            <pc:sldMk cId="2445644065" sldId="261"/>
+            <ac:cxnSpMk id="6" creationId="{BE5C24BB-A4AC-4242-BEA2-530797556820}"/>
+          </ac:cxnSpMkLst>
+        </pc:cxnChg>
+        <pc:cxnChg chg="add mod">
+          <ac:chgData name="Jonathan Marriott" userId="cb279729-bf8e-4205-bddf-7ed8b220c757" providerId="ADAL" clId="{7DFC69C6-FC9F-4905-B747-72124A4C8716}" dt="2022-04-28T09:44:36.213" v="538" actId="164"/>
+          <ac:cxnSpMkLst>
+            <pc:docMk/>
+            <pc:sldMk cId="2445644065" sldId="261"/>
+            <ac:cxnSpMk id="7" creationId="{16CEA979-31A4-461E-B0FC-6788D22DF509}"/>
+          </ac:cxnSpMkLst>
+        </pc:cxnChg>
+        <pc:cxnChg chg="add mod">
+          <ac:chgData name="Jonathan Marriott" userId="cb279729-bf8e-4205-bddf-7ed8b220c757" providerId="ADAL" clId="{7DFC69C6-FC9F-4905-B747-72124A4C8716}" dt="2022-04-28T09:44:36.213" v="538" actId="164"/>
+          <ac:cxnSpMkLst>
+            <pc:docMk/>
+            <pc:sldMk cId="2445644065" sldId="261"/>
+            <ac:cxnSpMk id="8" creationId="{DA3BF004-4A1A-4817-A978-AD2E36AE3319}"/>
+          </ac:cxnSpMkLst>
+        </pc:cxnChg>
+        <pc:cxnChg chg="add mod">
+          <ac:chgData name="Jonathan Marriott" userId="cb279729-bf8e-4205-bddf-7ed8b220c757" providerId="ADAL" clId="{7DFC69C6-FC9F-4905-B747-72124A4C8716}" dt="2022-04-28T09:44:36.213" v="538" actId="164"/>
+          <ac:cxnSpMkLst>
+            <pc:docMk/>
+            <pc:sldMk cId="2445644065" sldId="261"/>
+            <ac:cxnSpMk id="13" creationId="{848E6500-265D-4C18-A337-C0BAC7729C07}"/>
+          </ac:cxnSpMkLst>
+        </pc:cxnChg>
+        <pc:cxnChg chg="add mod">
+          <ac:chgData name="Jonathan Marriott" userId="cb279729-bf8e-4205-bddf-7ed8b220c757" providerId="ADAL" clId="{7DFC69C6-FC9F-4905-B747-72124A4C8716}" dt="2022-04-28T09:44:36.213" v="538" actId="164"/>
+          <ac:cxnSpMkLst>
+            <pc:docMk/>
+            <pc:sldMk cId="2445644065" sldId="261"/>
+            <ac:cxnSpMk id="15" creationId="{5E302981-3021-4972-8851-2B3A9A538696}"/>
+          </ac:cxnSpMkLst>
+        </pc:cxnChg>
+        <pc:cxnChg chg="add del">
+          <ac:chgData name="Jonathan Marriott" userId="cb279729-bf8e-4205-bddf-7ed8b220c757" providerId="ADAL" clId="{7DFC69C6-FC9F-4905-B747-72124A4C8716}" dt="2022-04-28T09:41:26.457" v="492" actId="11529"/>
+          <ac:cxnSpMkLst>
+            <pc:docMk/>
+            <pc:sldMk cId="2445644065" sldId="261"/>
+            <ac:cxnSpMk id="32" creationId="{E7F15916-515E-4A19-992D-FCBA0BA736ED}"/>
+          </ac:cxnSpMkLst>
+        </pc:cxnChg>
       </pc:sldChg>
     </pc:docChg>
   </pc:docChgLst>
@@ -2602,7 +2834,7 @@
           <a:p>
             <a:fld id="{EA0442CB-5924-48B1-892A-1F5E47C128C9}" type="datetimeFigureOut">
               <a:rPr lang="en-GB" smtClean="0"/>
-              <a:t>27/04/2022</a:t>
+              <a:t>28/04/2022</a:t>
             </a:fld>
             <a:endParaRPr lang="en-GB"/>
           </a:p>
@@ -2802,7 +3034,7 @@
           <a:p>
             <a:fld id="{EA0442CB-5924-48B1-892A-1F5E47C128C9}" type="datetimeFigureOut">
               <a:rPr lang="en-GB" smtClean="0"/>
-              <a:t>27/04/2022</a:t>
+              <a:t>28/04/2022</a:t>
             </a:fld>
             <a:endParaRPr lang="en-GB"/>
           </a:p>
@@ -3012,7 +3244,7 @@
           <a:p>
             <a:fld id="{EA0442CB-5924-48B1-892A-1F5E47C128C9}" type="datetimeFigureOut">
               <a:rPr lang="en-GB" smtClean="0"/>
-              <a:t>27/04/2022</a:t>
+              <a:t>28/04/2022</a:t>
             </a:fld>
             <a:endParaRPr lang="en-GB"/>
           </a:p>
@@ -3212,7 +3444,7 @@
           <a:p>
             <a:fld id="{EA0442CB-5924-48B1-892A-1F5E47C128C9}" type="datetimeFigureOut">
               <a:rPr lang="en-GB" smtClean="0"/>
-              <a:t>27/04/2022</a:t>
+              <a:t>28/04/2022</a:t>
             </a:fld>
             <a:endParaRPr lang="en-GB"/>
           </a:p>
@@ -3488,7 +3720,7 @@
           <a:p>
             <a:fld id="{EA0442CB-5924-48B1-892A-1F5E47C128C9}" type="datetimeFigureOut">
               <a:rPr lang="en-GB" smtClean="0"/>
-              <a:t>27/04/2022</a:t>
+              <a:t>28/04/2022</a:t>
             </a:fld>
             <a:endParaRPr lang="en-GB"/>
           </a:p>
@@ -3756,7 +3988,7 @@
           <a:p>
             <a:fld id="{EA0442CB-5924-48B1-892A-1F5E47C128C9}" type="datetimeFigureOut">
               <a:rPr lang="en-GB" smtClean="0"/>
-              <a:t>27/04/2022</a:t>
+              <a:t>28/04/2022</a:t>
             </a:fld>
             <a:endParaRPr lang="en-GB"/>
           </a:p>
@@ -4171,7 +4403,7 @@
           <a:p>
             <a:fld id="{EA0442CB-5924-48B1-892A-1F5E47C128C9}" type="datetimeFigureOut">
               <a:rPr lang="en-GB" smtClean="0"/>
-              <a:t>27/04/2022</a:t>
+              <a:t>28/04/2022</a:t>
             </a:fld>
             <a:endParaRPr lang="en-GB"/>
           </a:p>
@@ -4313,7 +4545,7 @@
           <a:p>
             <a:fld id="{EA0442CB-5924-48B1-892A-1F5E47C128C9}" type="datetimeFigureOut">
               <a:rPr lang="en-GB" smtClean="0"/>
-              <a:t>27/04/2022</a:t>
+              <a:t>28/04/2022</a:t>
             </a:fld>
             <a:endParaRPr lang="en-GB"/>
           </a:p>
@@ -4426,7 +4658,7 @@
           <a:p>
             <a:fld id="{EA0442CB-5924-48B1-892A-1F5E47C128C9}" type="datetimeFigureOut">
               <a:rPr lang="en-GB" smtClean="0"/>
-              <a:t>27/04/2022</a:t>
+              <a:t>28/04/2022</a:t>
             </a:fld>
             <a:endParaRPr lang="en-GB"/>
           </a:p>
@@ -4739,7 +4971,7 @@
           <a:p>
             <a:fld id="{EA0442CB-5924-48B1-892A-1F5E47C128C9}" type="datetimeFigureOut">
               <a:rPr lang="en-GB" smtClean="0"/>
-              <a:t>27/04/2022</a:t>
+              <a:t>28/04/2022</a:t>
             </a:fld>
             <a:endParaRPr lang="en-GB"/>
           </a:p>
@@ -5028,7 +5260,7 @@
           <a:p>
             <a:fld id="{EA0442CB-5924-48B1-892A-1F5E47C128C9}" type="datetimeFigureOut">
               <a:rPr lang="en-GB" smtClean="0"/>
-              <a:t>27/04/2022</a:t>
+              <a:t>28/04/2022</a:t>
             </a:fld>
             <a:endParaRPr lang="en-GB"/>
           </a:p>
@@ -5271,7 +5503,7 @@
           <a:p>
             <a:fld id="{EA0442CB-5924-48B1-892A-1F5E47C128C9}" type="datetimeFigureOut">
               <a:rPr lang="en-GB" smtClean="0"/>
-              <a:t>27/04/2022</a:t>
+              <a:t>28/04/2022</a:t>
             </a:fld>
             <a:endParaRPr lang="en-GB"/>
           </a:p>
@@ -11090,6 +11322,1180 @@
           <a:chExt cx="0" cy="0"/>
         </a:xfrm>
       </p:grpSpPr>
+      <p:grpSp>
+        <p:nvGrpSpPr>
+          <p:cNvPr id="34" name="Group 33">
+            <a:extLst>
+              <a:ext uri="{FF2B5EF4-FFF2-40B4-BE49-F238E27FC236}">
+                <a16:creationId xmlns:a16="http://schemas.microsoft.com/office/drawing/2014/main" id="{2E082531-2A68-4DD4-8E48-1D30431DD1A4}"/>
+              </a:ext>
+            </a:extLst>
+          </p:cNvPr>
+          <p:cNvGrpSpPr/>
+          <p:nvPr/>
+        </p:nvGrpSpPr>
+        <p:grpSpPr>
+          <a:xfrm>
+            <a:off x="895744" y="1180715"/>
+            <a:ext cx="5816072" cy="3614975"/>
+            <a:chOff x="895744" y="1180715"/>
+            <a:chExt cx="5816072" cy="3614975"/>
+          </a:xfrm>
+        </p:grpSpPr>
+        <p:cxnSp>
+          <p:nvCxnSpPr>
+            <p:cNvPr id="5" name="Straight Connector 4">
+              <a:extLst>
+                <a:ext uri="{FF2B5EF4-FFF2-40B4-BE49-F238E27FC236}">
+                  <a16:creationId xmlns:a16="http://schemas.microsoft.com/office/drawing/2014/main" id="{1DE88770-6193-42C5-9612-29489086FC81}"/>
+                </a:ext>
+              </a:extLst>
+            </p:cNvPr>
+            <p:cNvCxnSpPr/>
+            <p:nvPr/>
+          </p:nvCxnSpPr>
+          <p:spPr>
+            <a:xfrm>
+              <a:off x="1716833" y="3713583"/>
+              <a:ext cx="4991877" cy="0"/>
+            </a:xfrm>
+            <a:prstGeom prst="line">
+              <a:avLst/>
+            </a:prstGeom>
+            <a:ln w="28575">
+              <a:solidFill>
+                <a:schemeClr val="tx1"/>
+              </a:solidFill>
+              <a:prstDash val="sysDot"/>
+            </a:ln>
+          </p:spPr>
+          <p:style>
+            <a:lnRef idx="1">
+              <a:schemeClr val="accent1"/>
+            </a:lnRef>
+            <a:fillRef idx="0">
+              <a:schemeClr val="accent1"/>
+            </a:fillRef>
+            <a:effectRef idx="0">
+              <a:schemeClr val="accent1"/>
+            </a:effectRef>
+            <a:fontRef idx="minor">
+              <a:schemeClr val="tx1"/>
+            </a:fontRef>
+          </p:style>
+        </p:cxnSp>
+        <p:cxnSp>
+          <p:nvCxnSpPr>
+            <p:cNvPr id="6" name="Straight Connector 5">
+              <a:extLst>
+                <a:ext uri="{FF2B5EF4-FFF2-40B4-BE49-F238E27FC236}">
+                  <a16:creationId xmlns:a16="http://schemas.microsoft.com/office/drawing/2014/main" id="{BE5C24BB-A4AC-4242-BEA2-530797556820}"/>
+                </a:ext>
+              </a:extLst>
+            </p:cNvPr>
+            <p:cNvCxnSpPr/>
+            <p:nvPr/>
+          </p:nvCxnSpPr>
+          <p:spPr>
+            <a:xfrm>
+              <a:off x="1716833" y="1660850"/>
+              <a:ext cx="4991877" cy="0"/>
+            </a:xfrm>
+            <a:prstGeom prst="line">
+              <a:avLst/>
+            </a:prstGeom>
+            <a:ln w="28575">
+              <a:solidFill>
+                <a:schemeClr val="tx1"/>
+              </a:solidFill>
+              <a:prstDash val="sysDot"/>
+            </a:ln>
+          </p:spPr>
+          <p:style>
+            <a:lnRef idx="1">
+              <a:schemeClr val="accent1"/>
+            </a:lnRef>
+            <a:fillRef idx="0">
+              <a:schemeClr val="accent1"/>
+            </a:fillRef>
+            <a:effectRef idx="0">
+              <a:schemeClr val="accent1"/>
+            </a:effectRef>
+            <a:fontRef idx="minor">
+              <a:schemeClr val="tx1"/>
+            </a:fontRef>
+          </p:style>
+        </p:cxnSp>
+        <p:cxnSp>
+          <p:nvCxnSpPr>
+            <p:cNvPr id="7" name="Straight Connector 6">
+              <a:extLst>
+                <a:ext uri="{FF2B5EF4-FFF2-40B4-BE49-F238E27FC236}">
+                  <a16:creationId xmlns:a16="http://schemas.microsoft.com/office/drawing/2014/main" id="{16CEA979-31A4-461E-B0FC-6788D22DF509}"/>
+                </a:ext>
+              </a:extLst>
+            </p:cNvPr>
+            <p:cNvCxnSpPr/>
+            <p:nvPr/>
+          </p:nvCxnSpPr>
+          <p:spPr>
+            <a:xfrm>
+              <a:off x="1719939" y="1402691"/>
+              <a:ext cx="4991877" cy="0"/>
+            </a:xfrm>
+            <a:prstGeom prst="line">
+              <a:avLst/>
+            </a:prstGeom>
+            <a:ln w="28575">
+              <a:solidFill>
+                <a:schemeClr val="tx1"/>
+              </a:solidFill>
+              <a:prstDash val="solid"/>
+            </a:ln>
+          </p:spPr>
+          <p:style>
+            <a:lnRef idx="1">
+              <a:schemeClr val="accent1"/>
+            </a:lnRef>
+            <a:fillRef idx="0">
+              <a:schemeClr val="accent1"/>
+            </a:fillRef>
+            <a:effectRef idx="0">
+              <a:schemeClr val="accent1"/>
+            </a:effectRef>
+            <a:fontRef idx="minor">
+              <a:schemeClr val="tx1"/>
+            </a:fontRef>
+          </p:style>
+        </p:cxnSp>
+        <p:cxnSp>
+          <p:nvCxnSpPr>
+            <p:cNvPr id="8" name="Straight Connector 7">
+              <a:extLst>
+                <a:ext uri="{FF2B5EF4-FFF2-40B4-BE49-F238E27FC236}">
+                  <a16:creationId xmlns:a16="http://schemas.microsoft.com/office/drawing/2014/main" id="{DA3BF004-4A1A-4817-A978-AD2E36AE3319}"/>
+                </a:ext>
+              </a:extLst>
+            </p:cNvPr>
+            <p:cNvCxnSpPr/>
+            <p:nvPr/>
+          </p:nvCxnSpPr>
+          <p:spPr>
+            <a:xfrm>
+              <a:off x="1713718" y="3943736"/>
+              <a:ext cx="4991877" cy="0"/>
+            </a:xfrm>
+            <a:prstGeom prst="line">
+              <a:avLst/>
+            </a:prstGeom>
+            <a:ln w="28575">
+              <a:solidFill>
+                <a:schemeClr val="tx1"/>
+              </a:solidFill>
+              <a:prstDash val="solid"/>
+            </a:ln>
+          </p:spPr>
+          <p:style>
+            <a:lnRef idx="1">
+              <a:schemeClr val="accent1"/>
+            </a:lnRef>
+            <a:fillRef idx="0">
+              <a:schemeClr val="accent1"/>
+            </a:fillRef>
+            <a:effectRef idx="0">
+              <a:schemeClr val="accent1"/>
+            </a:effectRef>
+            <a:fontRef idx="minor">
+              <a:schemeClr val="tx1"/>
+            </a:fontRef>
+          </p:style>
+        </p:cxnSp>
+        <mc:AlternateContent xmlns:mc="http://schemas.openxmlformats.org/markup-compatibility/2006">
+          <mc:Choice xmlns:a14="http://schemas.microsoft.com/office/drawing/2010/main" Requires="a14">
+            <p:sp>
+              <p:nvSpPr>
+                <p:cNvPr id="9" name="TextBox 8">
+                  <a:extLst>
+                    <a:ext uri="{FF2B5EF4-FFF2-40B4-BE49-F238E27FC236}">
+                      <a16:creationId xmlns:a16="http://schemas.microsoft.com/office/drawing/2014/main" id="{BCAD10AF-702D-4D18-843B-4D924F73A9CB}"/>
+                    </a:ext>
+                  </a:extLst>
+                </p:cNvPr>
+                <p:cNvSpPr txBox="1"/>
+                <p:nvPr/>
+              </p:nvSpPr>
+              <p:spPr>
+                <a:xfrm>
+                  <a:off x="1365370" y="3811941"/>
+                  <a:ext cx="429208" cy="369332"/>
+                </a:xfrm>
+                <a:prstGeom prst="rect">
+                  <a:avLst/>
+                </a:prstGeom>
+                <a:noFill/>
+              </p:spPr>
+              <p:txBody>
+                <a:bodyPr wrap="square" rtlCol="0">
+                  <a:spAutoFit/>
+                </a:bodyPr>
+                <a:lstStyle/>
+                <a:p>
+                  <a14:m>
+                    <m:oMathPara xmlns:m="http://schemas.openxmlformats.org/officeDocument/2006/math">
+                      <m:oMathParaPr>
+                        <m:jc m:val="centerGroup"/>
+                      </m:oMathParaPr>
+                      <m:oMath xmlns:m="http://schemas.openxmlformats.org/officeDocument/2006/math">
+                        <m:r>
+                          <a:rPr lang="en-GB" b="0" i="1" smtClean="0">
+                            <a:latin typeface="Cambria Math" panose="02040503050406030204" pitchFamily="18" charset="0"/>
+                          </a:rPr>
+                          <m:t>0</m:t>
+                        </m:r>
+                      </m:oMath>
+                    </m:oMathPara>
+                  </a14:m>
+                  <a:endParaRPr lang="en-GB" dirty="0"/>
+                </a:p>
+              </p:txBody>
+            </p:sp>
+          </mc:Choice>
+          <mc:Fallback>
+            <p:sp>
+              <p:nvSpPr>
+                <p:cNvPr id="9" name="TextBox 8">
+                  <a:extLst>
+                    <a:ext uri="{FF2B5EF4-FFF2-40B4-BE49-F238E27FC236}">
+                      <a16:creationId xmlns:a16="http://schemas.microsoft.com/office/drawing/2014/main" id="{BCAD10AF-702D-4D18-843B-4D924F73A9CB}"/>
+                    </a:ext>
+                  </a:extLst>
+                </p:cNvPr>
+                <p:cNvSpPr txBox="1">
+                  <a:spLocks noRot="1" noChangeAspect="1" noMove="1" noResize="1" noEditPoints="1" noAdjustHandles="1" noChangeArrowheads="1" noChangeShapeType="1" noTextEdit="1"/>
+                </p:cNvSpPr>
+                <p:nvPr/>
+              </p:nvSpPr>
+              <p:spPr>
+                <a:xfrm>
+                  <a:off x="1365370" y="3811941"/>
+                  <a:ext cx="429208" cy="369332"/>
+                </a:xfrm>
+                <a:prstGeom prst="rect">
+                  <a:avLst/>
+                </a:prstGeom>
+                <a:blipFill>
+                  <a:blip r:embed="rId2"/>
+                  <a:stretch>
+                    <a:fillRect/>
+                  </a:stretch>
+                </a:blipFill>
+              </p:spPr>
+              <p:txBody>
+                <a:bodyPr/>
+                <a:lstStyle/>
+                <a:p>
+                  <a:r>
+                    <a:rPr lang="en-GB">
+                      <a:noFill/>
+                    </a:rPr>
+                    <a:t> </a:t>
+                  </a:r>
+                </a:p>
+              </p:txBody>
+            </p:sp>
+          </mc:Fallback>
+        </mc:AlternateContent>
+        <mc:AlternateContent xmlns:mc="http://schemas.openxmlformats.org/markup-compatibility/2006">
+          <mc:Choice xmlns:a14="http://schemas.microsoft.com/office/drawing/2010/main" Requires="a14">
+            <p:sp>
+              <p:nvSpPr>
+                <p:cNvPr id="10" name="TextBox 9">
+                  <a:extLst>
+                    <a:ext uri="{FF2B5EF4-FFF2-40B4-BE49-F238E27FC236}">
+                      <a16:creationId xmlns:a16="http://schemas.microsoft.com/office/drawing/2014/main" id="{3BC021FD-6B61-4C53-888F-62BE74133FDF}"/>
+                    </a:ext>
+                  </a:extLst>
+                </p:cNvPr>
+                <p:cNvSpPr txBox="1"/>
+                <p:nvPr/>
+              </p:nvSpPr>
+              <p:spPr>
+                <a:xfrm>
+                  <a:off x="1402694" y="1180715"/>
+                  <a:ext cx="429208" cy="369332"/>
+                </a:xfrm>
+                <a:prstGeom prst="rect">
+                  <a:avLst/>
+                </a:prstGeom>
+                <a:noFill/>
+              </p:spPr>
+              <p:txBody>
+                <a:bodyPr wrap="square" rtlCol="0">
+                  <a:spAutoFit/>
+                </a:bodyPr>
+                <a:lstStyle/>
+                <a:p>
+                  <a14:m>
+                    <m:oMathPara xmlns:m="http://schemas.openxmlformats.org/officeDocument/2006/math">
+                      <m:oMathParaPr>
+                        <m:jc m:val="centerGroup"/>
+                      </m:oMathParaPr>
+                      <m:oMath xmlns:m="http://schemas.openxmlformats.org/officeDocument/2006/math">
+                        <m:r>
+                          <a:rPr lang="en-GB" b="0" i="1" smtClean="0">
+                            <a:latin typeface="Cambria Math" panose="02040503050406030204" pitchFamily="18" charset="0"/>
+                          </a:rPr>
+                          <m:t>1</m:t>
+                        </m:r>
+                      </m:oMath>
+                    </m:oMathPara>
+                  </a14:m>
+                  <a:endParaRPr lang="en-GB" dirty="0"/>
+                </a:p>
+              </p:txBody>
+            </p:sp>
+          </mc:Choice>
+          <mc:Fallback>
+            <p:sp>
+              <p:nvSpPr>
+                <p:cNvPr id="10" name="TextBox 9">
+                  <a:extLst>
+                    <a:ext uri="{FF2B5EF4-FFF2-40B4-BE49-F238E27FC236}">
+                      <a16:creationId xmlns:a16="http://schemas.microsoft.com/office/drawing/2014/main" id="{3BC021FD-6B61-4C53-888F-62BE74133FDF}"/>
+                    </a:ext>
+                  </a:extLst>
+                </p:cNvPr>
+                <p:cNvSpPr txBox="1">
+                  <a:spLocks noRot="1" noChangeAspect="1" noMove="1" noResize="1" noEditPoints="1" noAdjustHandles="1" noChangeArrowheads="1" noChangeShapeType="1" noTextEdit="1"/>
+                </p:cNvSpPr>
+                <p:nvPr/>
+              </p:nvSpPr>
+              <p:spPr>
+                <a:xfrm>
+                  <a:off x="1402694" y="1180715"/>
+                  <a:ext cx="429208" cy="369332"/>
+                </a:xfrm>
+                <a:prstGeom prst="rect">
+                  <a:avLst/>
+                </a:prstGeom>
+                <a:blipFill>
+                  <a:blip r:embed="rId3"/>
+                  <a:stretch>
+                    <a:fillRect/>
+                  </a:stretch>
+                </a:blipFill>
+              </p:spPr>
+              <p:txBody>
+                <a:bodyPr/>
+                <a:lstStyle/>
+                <a:p>
+                  <a:r>
+                    <a:rPr lang="en-GB">
+                      <a:noFill/>
+                    </a:rPr>
+                    <a:t> </a:t>
+                  </a:r>
+                </a:p>
+              </p:txBody>
+            </p:sp>
+          </mc:Fallback>
+        </mc:AlternateContent>
+        <mc:AlternateContent xmlns:mc="http://schemas.openxmlformats.org/markup-compatibility/2006">
+          <mc:Choice xmlns:a14="http://schemas.microsoft.com/office/drawing/2010/main" Requires="a14">
+            <p:sp>
+              <p:nvSpPr>
+                <p:cNvPr id="11" name="TextBox 10">
+                  <a:extLst>
+                    <a:ext uri="{FF2B5EF4-FFF2-40B4-BE49-F238E27FC236}">
+                      <a16:creationId xmlns:a16="http://schemas.microsoft.com/office/drawing/2014/main" id="{5F0A1128-8BB1-4FA4-B685-D6B0165B3BE3}"/>
+                    </a:ext>
+                  </a:extLst>
+                </p:cNvPr>
+                <p:cNvSpPr txBox="1"/>
+                <p:nvPr/>
+              </p:nvSpPr>
+              <p:spPr>
+                <a:xfrm>
+                  <a:off x="1365370" y="3508507"/>
+                  <a:ext cx="429208" cy="369332"/>
+                </a:xfrm>
+                <a:prstGeom prst="rect">
+                  <a:avLst/>
+                </a:prstGeom>
+                <a:noFill/>
+              </p:spPr>
+              <p:txBody>
+                <a:bodyPr wrap="square" rtlCol="0">
+                  <a:spAutoFit/>
+                </a:bodyPr>
+                <a:lstStyle/>
+                <a:p>
+                  <a14:m>
+                    <m:oMathPara xmlns:m="http://schemas.openxmlformats.org/officeDocument/2006/math">
+                      <m:oMathParaPr>
+                        <m:jc m:val="centerGroup"/>
+                      </m:oMathParaPr>
+                      <m:oMath xmlns:m="http://schemas.openxmlformats.org/officeDocument/2006/math">
+                        <m:r>
+                          <a:rPr lang="en-GB" b="0" i="1" smtClean="0">
+                            <a:latin typeface="Cambria Math" panose="02040503050406030204" pitchFamily="18" charset="0"/>
+                          </a:rPr>
+                          <m:t>𝜖</m:t>
+                        </m:r>
+                      </m:oMath>
+                    </m:oMathPara>
+                  </a14:m>
+                  <a:endParaRPr lang="en-GB" dirty="0"/>
+                </a:p>
+              </p:txBody>
+            </p:sp>
+          </mc:Choice>
+          <mc:Fallback>
+            <p:sp>
+              <p:nvSpPr>
+                <p:cNvPr id="11" name="TextBox 10">
+                  <a:extLst>
+                    <a:ext uri="{FF2B5EF4-FFF2-40B4-BE49-F238E27FC236}">
+                      <a16:creationId xmlns:a16="http://schemas.microsoft.com/office/drawing/2014/main" id="{5F0A1128-8BB1-4FA4-B685-D6B0165B3BE3}"/>
+                    </a:ext>
+                  </a:extLst>
+                </p:cNvPr>
+                <p:cNvSpPr txBox="1">
+                  <a:spLocks noRot="1" noChangeAspect="1" noMove="1" noResize="1" noEditPoints="1" noAdjustHandles="1" noChangeArrowheads="1" noChangeShapeType="1" noTextEdit="1"/>
+                </p:cNvSpPr>
+                <p:nvPr/>
+              </p:nvSpPr>
+              <p:spPr>
+                <a:xfrm>
+                  <a:off x="1365370" y="3508507"/>
+                  <a:ext cx="429208" cy="369332"/>
+                </a:xfrm>
+                <a:prstGeom prst="rect">
+                  <a:avLst/>
+                </a:prstGeom>
+                <a:blipFill>
+                  <a:blip r:embed="rId4"/>
+                  <a:stretch>
+                    <a:fillRect/>
+                  </a:stretch>
+                </a:blipFill>
+              </p:spPr>
+              <p:txBody>
+                <a:bodyPr/>
+                <a:lstStyle/>
+                <a:p>
+                  <a:r>
+                    <a:rPr lang="en-GB">
+                      <a:noFill/>
+                    </a:rPr>
+                    <a:t> </a:t>
+                  </a:r>
+                </a:p>
+              </p:txBody>
+            </p:sp>
+          </mc:Fallback>
+        </mc:AlternateContent>
+        <mc:AlternateContent xmlns:mc="http://schemas.openxmlformats.org/markup-compatibility/2006">
+          <mc:Choice xmlns:a14="http://schemas.microsoft.com/office/drawing/2010/main" Requires="a14">
+            <p:sp>
+              <p:nvSpPr>
+                <p:cNvPr id="12" name="TextBox 11">
+                  <a:extLst>
+                    <a:ext uri="{FF2B5EF4-FFF2-40B4-BE49-F238E27FC236}">
+                      <a16:creationId xmlns:a16="http://schemas.microsoft.com/office/drawing/2014/main" id="{25002CEF-D5F4-4E1D-8E60-7E46B62A0D0A}"/>
+                    </a:ext>
+                  </a:extLst>
+                </p:cNvPr>
+                <p:cNvSpPr txBox="1"/>
+                <p:nvPr/>
+              </p:nvSpPr>
+              <p:spPr>
+                <a:xfrm>
+                  <a:off x="895744" y="1482309"/>
+                  <a:ext cx="1001476" cy="369332"/>
+                </a:xfrm>
+                <a:prstGeom prst="rect">
+                  <a:avLst/>
+                </a:prstGeom>
+                <a:noFill/>
+              </p:spPr>
+              <p:txBody>
+                <a:bodyPr wrap="square" rtlCol="0">
+                  <a:spAutoFit/>
+                </a:bodyPr>
+                <a:lstStyle/>
+                <a:p>
+                  <a14:m>
+                    <m:oMathPara xmlns:m="http://schemas.openxmlformats.org/officeDocument/2006/math">
+                      <m:oMathParaPr>
+                        <m:jc m:val="centerGroup"/>
+                      </m:oMathParaPr>
+                      <m:oMath xmlns:m="http://schemas.openxmlformats.org/officeDocument/2006/math">
+                        <m:r>
+                          <a:rPr lang="en-GB" b="0" i="1" smtClean="0">
+                            <a:latin typeface="Cambria Math" panose="02040503050406030204" pitchFamily="18" charset="0"/>
+                          </a:rPr>
+                          <m:t>1</m:t>
+                        </m:r>
+                        <m:r>
+                          <a:rPr lang="en-GB" b="0" i="1" smtClean="0">
+                            <a:latin typeface="Cambria Math" panose="02040503050406030204" pitchFamily="18" charset="0"/>
+                            <a:ea typeface="Cambria Math" panose="02040503050406030204" pitchFamily="18" charset="0"/>
+                          </a:rPr>
+                          <m:t>−</m:t>
+                        </m:r>
+                        <m:r>
+                          <a:rPr lang="en-GB" b="0" i="1" smtClean="0">
+                            <a:latin typeface="Cambria Math" panose="02040503050406030204" pitchFamily="18" charset="0"/>
+                          </a:rPr>
+                          <m:t>𝜖</m:t>
+                        </m:r>
+                      </m:oMath>
+                    </m:oMathPara>
+                  </a14:m>
+                  <a:endParaRPr lang="en-GB" dirty="0"/>
+                </a:p>
+              </p:txBody>
+            </p:sp>
+          </mc:Choice>
+          <mc:Fallback>
+            <p:sp>
+              <p:nvSpPr>
+                <p:cNvPr id="12" name="TextBox 11">
+                  <a:extLst>
+                    <a:ext uri="{FF2B5EF4-FFF2-40B4-BE49-F238E27FC236}">
+                      <a16:creationId xmlns:a16="http://schemas.microsoft.com/office/drawing/2014/main" id="{25002CEF-D5F4-4E1D-8E60-7E46B62A0D0A}"/>
+                    </a:ext>
+                  </a:extLst>
+                </p:cNvPr>
+                <p:cNvSpPr txBox="1">
+                  <a:spLocks noRot="1" noChangeAspect="1" noMove="1" noResize="1" noEditPoints="1" noAdjustHandles="1" noChangeArrowheads="1" noChangeShapeType="1" noTextEdit="1"/>
+                </p:cNvSpPr>
+                <p:nvPr/>
+              </p:nvSpPr>
+              <p:spPr>
+                <a:xfrm>
+                  <a:off x="895744" y="1482309"/>
+                  <a:ext cx="1001476" cy="369332"/>
+                </a:xfrm>
+                <a:prstGeom prst="rect">
+                  <a:avLst/>
+                </a:prstGeom>
+                <a:blipFill>
+                  <a:blip r:embed="rId5"/>
+                  <a:stretch>
+                    <a:fillRect/>
+                  </a:stretch>
+                </a:blipFill>
+              </p:spPr>
+              <p:txBody>
+                <a:bodyPr/>
+                <a:lstStyle/>
+                <a:p>
+                  <a:r>
+                    <a:rPr lang="en-GB">
+                      <a:noFill/>
+                    </a:rPr>
+                    <a:t> </a:t>
+                  </a:r>
+                </a:p>
+              </p:txBody>
+            </p:sp>
+          </mc:Fallback>
+        </mc:AlternateContent>
+        <p:cxnSp>
+          <p:nvCxnSpPr>
+            <p:cNvPr id="13" name="Straight Connector 12">
+              <a:extLst>
+                <a:ext uri="{FF2B5EF4-FFF2-40B4-BE49-F238E27FC236}">
+                  <a16:creationId xmlns:a16="http://schemas.microsoft.com/office/drawing/2014/main" id="{848E6500-265D-4C18-A337-C0BAC7729C07}"/>
+                </a:ext>
+              </a:extLst>
+            </p:cNvPr>
+            <p:cNvCxnSpPr>
+              <a:cxnSpLocks/>
+            </p:cNvCxnSpPr>
+            <p:nvPr/>
+          </p:nvCxnSpPr>
+          <p:spPr>
+            <a:xfrm flipV="1">
+              <a:off x="3637384" y="1402691"/>
+              <a:ext cx="0" cy="3083781"/>
+            </a:xfrm>
+            <a:prstGeom prst="line">
+              <a:avLst/>
+            </a:prstGeom>
+            <a:ln w="28575">
+              <a:solidFill>
+                <a:schemeClr val="tx1"/>
+              </a:solidFill>
+              <a:prstDash val="sysDash"/>
+            </a:ln>
+          </p:spPr>
+          <p:style>
+            <a:lnRef idx="1">
+              <a:schemeClr val="accent1"/>
+            </a:lnRef>
+            <a:fillRef idx="0">
+              <a:schemeClr val="accent1"/>
+            </a:fillRef>
+            <a:effectRef idx="0">
+              <a:schemeClr val="accent1"/>
+            </a:effectRef>
+            <a:fontRef idx="minor">
+              <a:schemeClr val="tx1"/>
+            </a:fontRef>
+          </p:style>
+        </p:cxnSp>
+        <p:cxnSp>
+          <p:nvCxnSpPr>
+            <p:cNvPr id="15" name="Straight Connector 14">
+              <a:extLst>
+                <a:ext uri="{FF2B5EF4-FFF2-40B4-BE49-F238E27FC236}">
+                  <a16:creationId xmlns:a16="http://schemas.microsoft.com/office/drawing/2014/main" id="{5E302981-3021-4972-8851-2B3A9A538696}"/>
+                </a:ext>
+              </a:extLst>
+            </p:cNvPr>
+            <p:cNvCxnSpPr>
+              <a:cxnSpLocks/>
+            </p:cNvCxnSpPr>
+            <p:nvPr/>
+          </p:nvCxnSpPr>
+          <p:spPr>
+            <a:xfrm flipV="1">
+              <a:off x="4209663" y="1402691"/>
+              <a:ext cx="0" cy="3077554"/>
+            </a:xfrm>
+            <a:prstGeom prst="line">
+              <a:avLst/>
+            </a:prstGeom>
+            <a:ln w="28575">
+              <a:solidFill>
+                <a:schemeClr val="tx1"/>
+              </a:solidFill>
+              <a:prstDash val="sysDash"/>
+            </a:ln>
+          </p:spPr>
+          <p:style>
+            <a:lnRef idx="1">
+              <a:schemeClr val="accent1"/>
+            </a:lnRef>
+            <a:fillRef idx="0">
+              <a:schemeClr val="accent1"/>
+            </a:fillRef>
+            <a:effectRef idx="0">
+              <a:schemeClr val="accent1"/>
+            </a:effectRef>
+            <a:fontRef idx="minor">
+              <a:schemeClr val="tx1"/>
+            </a:fontRef>
+          </p:style>
+        </p:cxnSp>
+        <mc:AlternateContent xmlns:mc="http://schemas.openxmlformats.org/markup-compatibility/2006">
+          <mc:Choice xmlns:a14="http://schemas.microsoft.com/office/drawing/2010/main" Requires="a14">
+            <p:sp>
+              <p:nvSpPr>
+                <p:cNvPr id="16" name="TextBox 15">
+                  <a:extLst>
+                    <a:ext uri="{FF2B5EF4-FFF2-40B4-BE49-F238E27FC236}">
+                      <a16:creationId xmlns:a16="http://schemas.microsoft.com/office/drawing/2014/main" id="{4668AD2A-1AB7-44CD-B647-AD4E79FB9EEF}"/>
+                    </a:ext>
+                  </a:extLst>
+                </p:cNvPr>
+                <p:cNvSpPr txBox="1"/>
+                <p:nvPr/>
+              </p:nvSpPr>
+              <p:spPr>
+                <a:xfrm>
+                  <a:off x="3422780" y="4416882"/>
+                  <a:ext cx="429208" cy="369332"/>
+                </a:xfrm>
+                <a:prstGeom prst="rect">
+                  <a:avLst/>
+                </a:prstGeom>
+                <a:noFill/>
+              </p:spPr>
+              <p:txBody>
+                <a:bodyPr wrap="square" rtlCol="0">
+                  <a:spAutoFit/>
+                </a:bodyPr>
+                <a:lstStyle/>
+                <a:p>
+                  <a14:m>
+                    <m:oMathPara xmlns:m="http://schemas.openxmlformats.org/officeDocument/2006/math">
+                      <m:oMathParaPr>
+                        <m:jc m:val="centerGroup"/>
+                      </m:oMathParaPr>
+                      <m:oMath xmlns:m="http://schemas.openxmlformats.org/officeDocument/2006/math">
+                        <m:r>
+                          <a:rPr lang="en-GB" b="0" i="1" smtClean="0">
+                            <a:latin typeface="Cambria Math" panose="02040503050406030204" pitchFamily="18" charset="0"/>
+                          </a:rPr>
+                          <m:t>𝑝</m:t>
+                        </m:r>
+                      </m:oMath>
+                    </m:oMathPara>
+                  </a14:m>
+                  <a:endParaRPr lang="en-GB" dirty="0"/>
+                </a:p>
+              </p:txBody>
+            </p:sp>
+          </mc:Choice>
+          <mc:Fallback>
+            <p:sp>
+              <p:nvSpPr>
+                <p:cNvPr id="16" name="TextBox 15">
+                  <a:extLst>
+                    <a:ext uri="{FF2B5EF4-FFF2-40B4-BE49-F238E27FC236}">
+                      <a16:creationId xmlns:a16="http://schemas.microsoft.com/office/drawing/2014/main" id="{4668AD2A-1AB7-44CD-B647-AD4E79FB9EEF}"/>
+                    </a:ext>
+                  </a:extLst>
+                </p:cNvPr>
+                <p:cNvSpPr txBox="1">
+                  <a:spLocks noRot="1" noChangeAspect="1" noMove="1" noResize="1" noEditPoints="1" noAdjustHandles="1" noChangeArrowheads="1" noChangeShapeType="1" noTextEdit="1"/>
+                </p:cNvSpPr>
+                <p:nvPr/>
+              </p:nvSpPr>
+              <p:spPr>
+                <a:xfrm>
+                  <a:off x="3422780" y="4416882"/>
+                  <a:ext cx="429208" cy="369332"/>
+                </a:xfrm>
+                <a:prstGeom prst="rect">
+                  <a:avLst/>
+                </a:prstGeom>
+                <a:blipFill>
+                  <a:blip r:embed="rId6"/>
+                  <a:stretch>
+                    <a:fillRect b="-6667"/>
+                  </a:stretch>
+                </a:blipFill>
+              </p:spPr>
+              <p:txBody>
+                <a:bodyPr/>
+                <a:lstStyle/>
+                <a:p>
+                  <a:r>
+                    <a:rPr lang="en-GB">
+                      <a:noFill/>
+                    </a:rPr>
+                    <a:t> </a:t>
+                  </a:r>
+                </a:p>
+              </p:txBody>
+            </p:sp>
+          </mc:Fallback>
+        </mc:AlternateContent>
+        <mc:AlternateContent xmlns:mc="http://schemas.openxmlformats.org/markup-compatibility/2006">
+          <mc:Choice xmlns:a14="http://schemas.microsoft.com/office/drawing/2010/main" Requires="a14">
+            <p:sp>
+              <p:nvSpPr>
+                <p:cNvPr id="17" name="TextBox 16">
+                  <a:extLst>
+                    <a:ext uri="{FF2B5EF4-FFF2-40B4-BE49-F238E27FC236}">
+                      <a16:creationId xmlns:a16="http://schemas.microsoft.com/office/drawing/2014/main" id="{8408BBD5-0FF0-4390-BE21-5C755CF26529}"/>
+                    </a:ext>
+                  </a:extLst>
+                </p:cNvPr>
+                <p:cNvSpPr txBox="1"/>
+                <p:nvPr/>
+              </p:nvSpPr>
+              <p:spPr>
+                <a:xfrm>
+                  <a:off x="3995052" y="4426358"/>
+                  <a:ext cx="429208" cy="369332"/>
+                </a:xfrm>
+                <a:prstGeom prst="rect">
+                  <a:avLst/>
+                </a:prstGeom>
+                <a:noFill/>
+              </p:spPr>
+              <p:txBody>
+                <a:bodyPr wrap="square" rtlCol="0">
+                  <a:spAutoFit/>
+                </a:bodyPr>
+                <a:lstStyle/>
+                <a:p>
+                  <a14:m>
+                    <m:oMathPara xmlns:m="http://schemas.openxmlformats.org/officeDocument/2006/math">
+                      <m:oMathParaPr>
+                        <m:jc m:val="centerGroup"/>
+                      </m:oMathParaPr>
+                      <m:oMath xmlns:m="http://schemas.openxmlformats.org/officeDocument/2006/math">
+                        <m:r>
+                          <a:rPr lang="en-GB" b="0" i="1" smtClean="0">
+                            <a:latin typeface="Cambria Math" panose="02040503050406030204" pitchFamily="18" charset="0"/>
+                          </a:rPr>
+                          <m:t>𝑞</m:t>
+                        </m:r>
+                      </m:oMath>
+                    </m:oMathPara>
+                  </a14:m>
+                  <a:endParaRPr lang="en-GB" dirty="0"/>
+                </a:p>
+              </p:txBody>
+            </p:sp>
+          </mc:Choice>
+          <mc:Fallback>
+            <p:sp>
+              <p:nvSpPr>
+                <p:cNvPr id="17" name="TextBox 16">
+                  <a:extLst>
+                    <a:ext uri="{FF2B5EF4-FFF2-40B4-BE49-F238E27FC236}">
+                      <a16:creationId xmlns:a16="http://schemas.microsoft.com/office/drawing/2014/main" id="{8408BBD5-0FF0-4390-BE21-5C755CF26529}"/>
+                    </a:ext>
+                  </a:extLst>
+                </p:cNvPr>
+                <p:cNvSpPr txBox="1">
+                  <a:spLocks noRot="1" noChangeAspect="1" noMove="1" noResize="1" noEditPoints="1" noAdjustHandles="1" noChangeArrowheads="1" noChangeShapeType="1" noTextEdit="1"/>
+                </p:cNvSpPr>
+                <p:nvPr/>
+              </p:nvSpPr>
+              <p:spPr>
+                <a:xfrm>
+                  <a:off x="3995052" y="4426358"/>
+                  <a:ext cx="429208" cy="369332"/>
+                </a:xfrm>
+                <a:prstGeom prst="rect">
+                  <a:avLst/>
+                </a:prstGeom>
+                <a:blipFill>
+                  <a:blip r:embed="rId7"/>
+                  <a:stretch>
+                    <a:fillRect b="-6557"/>
+                  </a:stretch>
+                </a:blipFill>
+              </p:spPr>
+              <p:txBody>
+                <a:bodyPr/>
+                <a:lstStyle/>
+                <a:p>
+                  <a:r>
+                    <a:rPr lang="en-GB">
+                      <a:noFill/>
+                    </a:rPr>
+                    <a:t> </a:t>
+                  </a:r>
+                </a:p>
+              </p:txBody>
+            </p:sp>
+          </mc:Fallback>
+        </mc:AlternateContent>
+        <p:sp>
+          <p:nvSpPr>
+            <p:cNvPr id="33" name="Freeform: Shape 32">
+              <a:extLst>
+                <a:ext uri="{FF2B5EF4-FFF2-40B4-BE49-F238E27FC236}">
+                  <a16:creationId xmlns:a16="http://schemas.microsoft.com/office/drawing/2014/main" id="{EA139643-B1FA-4F30-93C9-537ECD23AEA9}"/>
+                </a:ext>
+              </a:extLst>
+            </p:cNvPr>
+            <p:cNvSpPr/>
+            <p:nvPr/>
+          </p:nvSpPr>
+          <p:spPr>
+            <a:xfrm>
+              <a:off x="1732934" y="1511708"/>
+              <a:ext cx="4948086" cy="2349680"/>
+            </a:xfrm>
+            <a:custGeom>
+              <a:avLst/>
+              <a:gdLst>
+                <a:gd name="connsiteX0" fmla="*/ 0 w 5604388"/>
+                <a:gd name="connsiteY0" fmla="*/ 2367116 h 2492458"/>
+                <a:gd name="connsiteX1" fmla="*/ 1850923 w 5604388"/>
+                <a:gd name="connsiteY1" fmla="*/ 2293374 h 2492458"/>
+                <a:gd name="connsiteX2" fmla="*/ 2271252 w 5604388"/>
+                <a:gd name="connsiteY2" fmla="*/ 494071 h 2492458"/>
+                <a:gd name="connsiteX3" fmla="*/ 2617839 w 5604388"/>
+                <a:gd name="connsiteY3" fmla="*/ 81116 h 2492458"/>
+                <a:gd name="connsiteX4" fmla="*/ 4940710 w 5604388"/>
+                <a:gd name="connsiteY4" fmla="*/ 14748 h 2492458"/>
+                <a:gd name="connsiteX5" fmla="*/ 5604388 w 5604388"/>
+                <a:gd name="connsiteY5" fmla="*/ 0 h 2492458"/>
+                <a:gd name="connsiteX0" fmla="*/ 0 w 5604388"/>
+                <a:gd name="connsiteY0" fmla="*/ 2367116 h 2498780"/>
+                <a:gd name="connsiteX1" fmla="*/ 1850923 w 5604388"/>
+                <a:gd name="connsiteY1" fmla="*/ 2293374 h 2498780"/>
+                <a:gd name="connsiteX2" fmla="*/ 2286001 w 5604388"/>
+                <a:gd name="connsiteY2" fmla="*/ 398207 h 2498780"/>
+                <a:gd name="connsiteX3" fmla="*/ 2617839 w 5604388"/>
+                <a:gd name="connsiteY3" fmla="*/ 81116 h 2498780"/>
+                <a:gd name="connsiteX4" fmla="*/ 4940710 w 5604388"/>
+                <a:gd name="connsiteY4" fmla="*/ 14748 h 2498780"/>
+                <a:gd name="connsiteX5" fmla="*/ 5604388 w 5604388"/>
+                <a:gd name="connsiteY5" fmla="*/ 0 h 2498780"/>
+                <a:gd name="connsiteX0" fmla="*/ 0 w 5604388"/>
+                <a:gd name="connsiteY0" fmla="*/ 2367116 h 2443129"/>
+                <a:gd name="connsiteX1" fmla="*/ 1917291 w 5604388"/>
+                <a:gd name="connsiteY1" fmla="*/ 2168013 h 2443129"/>
+                <a:gd name="connsiteX2" fmla="*/ 2286001 w 5604388"/>
+                <a:gd name="connsiteY2" fmla="*/ 398207 h 2443129"/>
+                <a:gd name="connsiteX3" fmla="*/ 2617839 w 5604388"/>
+                <a:gd name="connsiteY3" fmla="*/ 81116 h 2443129"/>
+                <a:gd name="connsiteX4" fmla="*/ 4940710 w 5604388"/>
+                <a:gd name="connsiteY4" fmla="*/ 14748 h 2443129"/>
+                <a:gd name="connsiteX5" fmla="*/ 5604388 w 5604388"/>
+                <a:gd name="connsiteY5" fmla="*/ 0 h 2443129"/>
+                <a:gd name="connsiteX0" fmla="*/ 0 w 5604388"/>
+                <a:gd name="connsiteY0" fmla="*/ 2367116 h 2408623"/>
+                <a:gd name="connsiteX1" fmla="*/ 1917291 w 5604388"/>
+                <a:gd name="connsiteY1" fmla="*/ 2168013 h 2408623"/>
+                <a:gd name="connsiteX2" fmla="*/ 2286001 w 5604388"/>
+                <a:gd name="connsiteY2" fmla="*/ 398207 h 2408623"/>
+                <a:gd name="connsiteX3" fmla="*/ 2617839 w 5604388"/>
+                <a:gd name="connsiteY3" fmla="*/ 81116 h 2408623"/>
+                <a:gd name="connsiteX4" fmla="*/ 4940710 w 5604388"/>
+                <a:gd name="connsiteY4" fmla="*/ 14748 h 2408623"/>
+                <a:gd name="connsiteX5" fmla="*/ 5604388 w 5604388"/>
+                <a:gd name="connsiteY5" fmla="*/ 0 h 2408623"/>
+                <a:gd name="connsiteX0" fmla="*/ 0 w 5589640"/>
+                <a:gd name="connsiteY0" fmla="*/ 2352367 h 2432783"/>
+                <a:gd name="connsiteX1" fmla="*/ 1902543 w 5589640"/>
+                <a:gd name="connsiteY1" fmla="*/ 2168013 h 2432783"/>
+                <a:gd name="connsiteX2" fmla="*/ 2271253 w 5589640"/>
+                <a:gd name="connsiteY2" fmla="*/ 398207 h 2432783"/>
+                <a:gd name="connsiteX3" fmla="*/ 2603091 w 5589640"/>
+                <a:gd name="connsiteY3" fmla="*/ 81116 h 2432783"/>
+                <a:gd name="connsiteX4" fmla="*/ 4925962 w 5589640"/>
+                <a:gd name="connsiteY4" fmla="*/ 14748 h 2432783"/>
+                <a:gd name="connsiteX5" fmla="*/ 5589640 w 5589640"/>
+                <a:gd name="connsiteY5" fmla="*/ 0 h 2432783"/>
+                <a:gd name="connsiteX0" fmla="*/ 0 w 5589640"/>
+                <a:gd name="connsiteY0" fmla="*/ 2352367 h 2386335"/>
+                <a:gd name="connsiteX1" fmla="*/ 1902543 w 5589640"/>
+                <a:gd name="connsiteY1" fmla="*/ 2168013 h 2386335"/>
+                <a:gd name="connsiteX2" fmla="*/ 2271253 w 5589640"/>
+                <a:gd name="connsiteY2" fmla="*/ 398207 h 2386335"/>
+                <a:gd name="connsiteX3" fmla="*/ 2603091 w 5589640"/>
+                <a:gd name="connsiteY3" fmla="*/ 81116 h 2386335"/>
+                <a:gd name="connsiteX4" fmla="*/ 4925962 w 5589640"/>
+                <a:gd name="connsiteY4" fmla="*/ 14748 h 2386335"/>
+                <a:gd name="connsiteX5" fmla="*/ 5589640 w 5589640"/>
+                <a:gd name="connsiteY5" fmla="*/ 0 h 2386335"/>
+                <a:gd name="connsiteX0" fmla="*/ 0 w 5589640"/>
+                <a:gd name="connsiteY0" fmla="*/ 2352367 h 2382614"/>
+                <a:gd name="connsiteX1" fmla="*/ 1902543 w 5589640"/>
+                <a:gd name="connsiteY1" fmla="*/ 2168013 h 2382614"/>
+                <a:gd name="connsiteX2" fmla="*/ 2271253 w 5589640"/>
+                <a:gd name="connsiteY2" fmla="*/ 464575 h 2382614"/>
+                <a:gd name="connsiteX3" fmla="*/ 2603091 w 5589640"/>
+                <a:gd name="connsiteY3" fmla="*/ 81116 h 2382614"/>
+                <a:gd name="connsiteX4" fmla="*/ 4925962 w 5589640"/>
+                <a:gd name="connsiteY4" fmla="*/ 14748 h 2382614"/>
+                <a:gd name="connsiteX5" fmla="*/ 5589640 w 5589640"/>
+                <a:gd name="connsiteY5" fmla="*/ 0 h 2382614"/>
+                <a:gd name="connsiteX0" fmla="*/ 0 w 5589640"/>
+                <a:gd name="connsiteY0" fmla="*/ 2352367 h 2382614"/>
+                <a:gd name="connsiteX1" fmla="*/ 1902543 w 5589640"/>
+                <a:gd name="connsiteY1" fmla="*/ 2168013 h 2382614"/>
+                <a:gd name="connsiteX2" fmla="*/ 2271253 w 5589640"/>
+                <a:gd name="connsiteY2" fmla="*/ 464575 h 2382614"/>
+                <a:gd name="connsiteX3" fmla="*/ 2603091 w 5589640"/>
+                <a:gd name="connsiteY3" fmla="*/ 81116 h 2382614"/>
+                <a:gd name="connsiteX4" fmla="*/ 4925962 w 5589640"/>
+                <a:gd name="connsiteY4" fmla="*/ 14748 h 2382614"/>
+                <a:gd name="connsiteX5" fmla="*/ 5589640 w 5589640"/>
+                <a:gd name="connsiteY5" fmla="*/ 0 h 2382614"/>
+                <a:gd name="connsiteX0" fmla="*/ 0 w 5589640"/>
+                <a:gd name="connsiteY0" fmla="*/ 2352367 h 2382614"/>
+                <a:gd name="connsiteX1" fmla="*/ 1902543 w 5589640"/>
+                <a:gd name="connsiteY1" fmla="*/ 2168013 h 2382614"/>
+                <a:gd name="connsiteX2" fmla="*/ 2271253 w 5589640"/>
+                <a:gd name="connsiteY2" fmla="*/ 464575 h 2382614"/>
+                <a:gd name="connsiteX3" fmla="*/ 2750575 w 5589640"/>
+                <a:gd name="connsiteY3" fmla="*/ 73742 h 2382614"/>
+                <a:gd name="connsiteX4" fmla="*/ 4925962 w 5589640"/>
+                <a:gd name="connsiteY4" fmla="*/ 14748 h 2382614"/>
+                <a:gd name="connsiteX5" fmla="*/ 5589640 w 5589640"/>
+                <a:gd name="connsiteY5" fmla="*/ 0 h 2382614"/>
+                <a:gd name="connsiteX0" fmla="*/ 0 w 5589640"/>
+                <a:gd name="connsiteY0" fmla="*/ 2359992 h 2372053"/>
+                <a:gd name="connsiteX1" fmla="*/ 1902543 w 5589640"/>
+                <a:gd name="connsiteY1" fmla="*/ 2175638 h 2372053"/>
+                <a:gd name="connsiteX2" fmla="*/ 2234383 w 5589640"/>
+                <a:gd name="connsiteY2" fmla="*/ 848284 h 2372053"/>
+                <a:gd name="connsiteX3" fmla="*/ 2750575 w 5589640"/>
+                <a:gd name="connsiteY3" fmla="*/ 81367 h 2372053"/>
+                <a:gd name="connsiteX4" fmla="*/ 4925962 w 5589640"/>
+                <a:gd name="connsiteY4" fmla="*/ 22373 h 2372053"/>
+                <a:gd name="connsiteX5" fmla="*/ 5589640 w 5589640"/>
+                <a:gd name="connsiteY5" fmla="*/ 7625 h 2372053"/>
+                <a:gd name="connsiteX0" fmla="*/ 0 w 5589640"/>
+                <a:gd name="connsiteY0" fmla="*/ 2359992 h 2372053"/>
+                <a:gd name="connsiteX1" fmla="*/ 1902543 w 5589640"/>
+                <a:gd name="connsiteY1" fmla="*/ 2175638 h 2372053"/>
+                <a:gd name="connsiteX2" fmla="*/ 2234383 w 5589640"/>
+                <a:gd name="connsiteY2" fmla="*/ 848284 h 2372053"/>
+                <a:gd name="connsiteX3" fmla="*/ 2750575 w 5589640"/>
+                <a:gd name="connsiteY3" fmla="*/ 81367 h 2372053"/>
+                <a:gd name="connsiteX4" fmla="*/ 4925962 w 5589640"/>
+                <a:gd name="connsiteY4" fmla="*/ 22373 h 2372053"/>
+                <a:gd name="connsiteX5" fmla="*/ 5589640 w 5589640"/>
+                <a:gd name="connsiteY5" fmla="*/ 7625 h 2372053"/>
+                <a:gd name="connsiteX0" fmla="*/ 0 w 5589640"/>
+                <a:gd name="connsiteY0" fmla="*/ 2359992 h 2372053"/>
+                <a:gd name="connsiteX1" fmla="*/ 1902543 w 5589640"/>
+                <a:gd name="connsiteY1" fmla="*/ 2175638 h 2372053"/>
+                <a:gd name="connsiteX2" fmla="*/ 2234383 w 5589640"/>
+                <a:gd name="connsiteY2" fmla="*/ 848284 h 2372053"/>
+                <a:gd name="connsiteX3" fmla="*/ 2750575 w 5589640"/>
+                <a:gd name="connsiteY3" fmla="*/ 81367 h 2372053"/>
+                <a:gd name="connsiteX4" fmla="*/ 4925962 w 5589640"/>
+                <a:gd name="connsiteY4" fmla="*/ 22373 h 2372053"/>
+                <a:gd name="connsiteX5" fmla="*/ 5589640 w 5589640"/>
+                <a:gd name="connsiteY5" fmla="*/ 7625 h 2372053"/>
+                <a:gd name="connsiteX0" fmla="*/ 0 w 5589640"/>
+                <a:gd name="connsiteY0" fmla="*/ 2352367 h 2364428"/>
+                <a:gd name="connsiteX1" fmla="*/ 1902543 w 5589640"/>
+                <a:gd name="connsiteY1" fmla="*/ 2168013 h 2364428"/>
+                <a:gd name="connsiteX2" fmla="*/ 2234383 w 5589640"/>
+                <a:gd name="connsiteY2" fmla="*/ 840659 h 2364428"/>
+                <a:gd name="connsiteX3" fmla="*/ 2750575 w 5589640"/>
+                <a:gd name="connsiteY3" fmla="*/ 73742 h 2364428"/>
+                <a:gd name="connsiteX4" fmla="*/ 4925962 w 5589640"/>
+                <a:gd name="connsiteY4" fmla="*/ 14748 h 2364428"/>
+                <a:gd name="connsiteX5" fmla="*/ 5589640 w 5589640"/>
+                <a:gd name="connsiteY5" fmla="*/ 0 h 2364428"/>
+                <a:gd name="connsiteX0" fmla="*/ 0 w 5073447"/>
+                <a:gd name="connsiteY0" fmla="*/ 2337619 h 2349680"/>
+                <a:gd name="connsiteX1" fmla="*/ 1902543 w 5073447"/>
+                <a:gd name="connsiteY1" fmla="*/ 2153265 h 2349680"/>
+                <a:gd name="connsiteX2" fmla="*/ 2234383 w 5073447"/>
+                <a:gd name="connsiteY2" fmla="*/ 825911 h 2349680"/>
+                <a:gd name="connsiteX3" fmla="*/ 2750575 w 5073447"/>
+                <a:gd name="connsiteY3" fmla="*/ 58994 h 2349680"/>
+                <a:gd name="connsiteX4" fmla="*/ 4925962 w 5073447"/>
+                <a:gd name="connsiteY4" fmla="*/ 0 h 2349680"/>
+                <a:gd name="connsiteX5" fmla="*/ 5073447 w 5073447"/>
+                <a:gd name="connsiteY5" fmla="*/ 14749 h 2349680"/>
+                <a:gd name="connsiteX0" fmla="*/ 0 w 4948086"/>
+                <a:gd name="connsiteY0" fmla="*/ 2337619 h 2349680"/>
+                <a:gd name="connsiteX1" fmla="*/ 1902543 w 4948086"/>
+                <a:gd name="connsiteY1" fmla="*/ 2153265 h 2349680"/>
+                <a:gd name="connsiteX2" fmla="*/ 2234383 w 4948086"/>
+                <a:gd name="connsiteY2" fmla="*/ 825911 h 2349680"/>
+                <a:gd name="connsiteX3" fmla="*/ 2750575 w 4948086"/>
+                <a:gd name="connsiteY3" fmla="*/ 58994 h 2349680"/>
+                <a:gd name="connsiteX4" fmla="*/ 4925962 w 4948086"/>
+                <a:gd name="connsiteY4" fmla="*/ 0 h 2349680"/>
+                <a:gd name="connsiteX5" fmla="*/ 4948086 w 4948086"/>
+                <a:gd name="connsiteY5" fmla="*/ 7374 h 2349680"/>
+              </a:gdLst>
+              <a:ahLst/>
+              <a:cxnLst>
+                <a:cxn ang="0">
+                  <a:pos x="connsiteX0" y="connsiteY0"/>
+                </a:cxn>
+                <a:cxn ang="0">
+                  <a:pos x="connsiteX1" y="connsiteY1"/>
+                </a:cxn>
+                <a:cxn ang="0">
+                  <a:pos x="connsiteX2" y="connsiteY2"/>
+                </a:cxn>
+                <a:cxn ang="0">
+                  <a:pos x="connsiteX3" y="connsiteY3"/>
+                </a:cxn>
+                <a:cxn ang="0">
+                  <a:pos x="connsiteX4" y="connsiteY4"/>
+                </a:cxn>
+                <a:cxn ang="0">
+                  <a:pos x="connsiteX5" y="connsiteY5"/>
+                </a:cxn>
+              </a:cxnLst>
+              <a:rect l="l" t="t" r="r" b="b"/>
+              <a:pathLst>
+                <a:path w="4948086" h="2349680">
+                  <a:moveTo>
+                    <a:pt x="0" y="2337619"/>
+                  </a:moveTo>
+                  <a:cubicBezTo>
+                    <a:pt x="1031158" y="2346222"/>
+                    <a:pt x="1530146" y="2405216"/>
+                    <a:pt x="1902543" y="2153265"/>
+                  </a:cubicBezTo>
+                  <a:cubicBezTo>
+                    <a:pt x="2274940" y="1901314"/>
+                    <a:pt x="2174160" y="1182330"/>
+                    <a:pt x="2234383" y="825911"/>
+                  </a:cubicBezTo>
+                  <a:cubicBezTo>
+                    <a:pt x="2294606" y="469492"/>
+                    <a:pt x="2265108" y="71285"/>
+                    <a:pt x="2750575" y="58994"/>
+                  </a:cubicBezTo>
+                  <a:lnTo>
+                    <a:pt x="4925962" y="0"/>
+                  </a:lnTo>
+                  <a:lnTo>
+                    <a:pt x="4948086" y="7374"/>
+                  </a:lnTo>
+                </a:path>
+              </a:pathLst>
+            </a:custGeom>
+            <a:noFill/>
+            <a:ln w="19050">
+              <a:solidFill>
+                <a:srgbClr val="FF0000"/>
+              </a:solidFill>
+            </a:ln>
+          </p:spPr>
+          <p:style>
+            <a:lnRef idx="2">
+              <a:schemeClr val="accent1">
+                <a:shade val="50000"/>
+              </a:schemeClr>
+            </a:lnRef>
+            <a:fillRef idx="1">
+              <a:schemeClr val="accent1"/>
+            </a:fillRef>
+            <a:effectRef idx="0">
+              <a:schemeClr val="accent1"/>
+            </a:effectRef>
+            <a:fontRef idx="minor">
+              <a:schemeClr val="lt1"/>
+            </a:fontRef>
+          </p:style>
+          <p:txBody>
+            <a:bodyPr rtlCol="0" anchor="ctr"/>
+            <a:lstStyle/>
+            <a:p>
+              <a:pPr algn="ctr"/>
+              <a:endParaRPr lang="en-GB"/>
+            </a:p>
+          </p:txBody>
+        </p:sp>
+      </p:grpSp>
+    </p:spTree>
+    <p:extLst>
+      <p:ext uri="{BB962C8B-B14F-4D97-AF65-F5344CB8AC3E}">
+        <p14:creationId xmlns:p14="http://schemas.microsoft.com/office/powerpoint/2010/main" val="2445644065"/>
+      </p:ext>
+    </p:extLst>
+  </p:cSld>
+  <p:clrMapOvr>
+    <a:masterClrMapping/>
+  </p:clrMapOvr>
+</p:sld>
+</file>
+
+<file path=ppt/slides/slide4.xml><?xml version="1.0" encoding="utf-8"?>
+<p:sld xmlns:a="http://schemas.openxmlformats.org/drawingml/2006/main" xmlns:r="http://schemas.openxmlformats.org/officeDocument/2006/relationships" xmlns:p="http://schemas.openxmlformats.org/presentationml/2006/main">
+  <p:cSld>
+    <p:spTree>
+      <p:nvGrpSpPr>
+        <p:cNvPr id="1" name=""/>
+        <p:cNvGrpSpPr/>
+        <p:nvPr/>
+      </p:nvGrpSpPr>
+      <p:grpSpPr>
+        <a:xfrm>
+          <a:off x="0" y="0"/>
+          <a:ext cx="0" cy="0"/>
+          <a:chOff x="0" y="0"/>
+          <a:chExt cx="0" cy="0"/>
+        </a:xfrm>
+      </p:grpSpPr>
       <p:pic>
         <p:nvPicPr>
           <p:cNvPr id="2051" name="Picture 3" descr="Ink Drawings&#10;Ink Drawings&#10;Ink Drawings&#10;Ink Drawings&#10;Ink Drawings&#10;Ink Drawings&#10;Ink Drawings&#10;Ink Drawings&#10;Ink Drawings&#10;Ink Drawings&#10;Ink Drawings&#10;Ink Drawings&#10;Ink Drawings&#10;Ink Drawings&#10;Ink Drawings&#10;Ink Drawings&#10;2𝑛&#10;2𝑛&#10;6𝑛&#10;Ink Drawings&#10;Ink Drawings&#10;Ink Drawings&#10;Origin&#10;">
@@ -11197,7 +12603,7 @@
 </p:sld>
 </file>
 
-<file path=ppt/slides/slide4.xml><?xml version="1.0" encoding="utf-8"?>
+<file path=ppt/slides/slide5.xml><?xml version="1.0" encoding="utf-8"?>
 <p:sld xmlns:a="http://schemas.openxmlformats.org/drawingml/2006/main" xmlns:r="http://schemas.openxmlformats.org/officeDocument/2006/relationships" xmlns:p="http://schemas.openxmlformats.org/presentationml/2006/main">
   <p:cSld>
     <p:spTree>
@@ -11274,7 +12680,7 @@
 </p:sld>
 </file>
 
-<file path=ppt/slides/slide5.xml><?xml version="1.0" encoding="utf-8"?>
+<file path=ppt/slides/slide6.xml><?xml version="1.0" encoding="utf-8"?>
 <p:sld xmlns:a="http://schemas.openxmlformats.org/drawingml/2006/main" xmlns:r="http://schemas.openxmlformats.org/officeDocument/2006/relationships" xmlns:p="http://schemas.openxmlformats.org/presentationml/2006/main">
   <p:cSld>
     <p:spTree>

</xml_diff>